<commit_message>
Updated presentation and added backup report
</commit_message>
<xml_diff>
--- a/documentation/slides/PresentationMar21.pptx
+++ b/documentation/slides/PresentationMar21.pptx
@@ -17,23 +17,25 @@
     <p:sldId id="262" r:id="rId11"/>
     <p:sldId id="263" r:id="rId12"/>
     <p:sldId id="264" r:id="rId13"/>
+    <p:sldId id="265" r:id="rId14"/>
+    <p:sldId id="266" r:id="rId15"/>
   </p:sldIdLst>
   <p:sldSz cy="5143500" cx="9144000"/>
   <p:notesSz cx="6858000" cy="9144000"/>
   <p:embeddedFontLst>
     <p:embeddedFont>
       <p:font typeface="Montserrat"/>
-      <p:regular r:id="rId14"/>
-      <p:bold r:id="rId15"/>
-      <p:italic r:id="rId16"/>
-      <p:boldItalic r:id="rId17"/>
+      <p:regular r:id="rId16"/>
+      <p:bold r:id="rId17"/>
+      <p:italic r:id="rId18"/>
+      <p:boldItalic r:id="rId19"/>
     </p:embeddedFont>
     <p:embeddedFont>
       <p:font typeface="Lato"/>
-      <p:regular r:id="rId18"/>
-      <p:bold r:id="rId19"/>
-      <p:italic r:id="rId20"/>
-      <p:boldItalic r:id="rId21"/>
+      <p:regular r:id="rId20"/>
+      <p:bold r:id="rId21"/>
+      <p:italic r:id="rId22"/>
+      <p:boldItalic r:id="rId23"/>
     </p:embeddedFont>
   </p:embeddedFontLst>
   <p:defaultTextStyle>
@@ -791,12 +793,12 @@
 </p:notes>
 </file>
 
-<file path=ppt/notesSlides/notesSlide2.xml><?xml version="1.0" encoding="utf-8"?>
+<file path=ppt/notesSlides/notesSlide10.xml><?xml version="1.0" encoding="utf-8"?>
 <p:notes xmlns:a="http://schemas.openxmlformats.org/drawingml/2006/main" xmlns:r="http://schemas.openxmlformats.org/officeDocument/2006/relationships" xmlns:mc="http://schemas.openxmlformats.org/markup-compatibility/2006" xmlns:mv="urn:schemas-microsoft-com:mac:vml" xmlns:p="http://schemas.openxmlformats.org/presentationml/2006/main" xmlns:c="http://schemas.openxmlformats.org/drawingml/2006/chart" xmlns:dgm="http://schemas.openxmlformats.org/drawingml/2006/diagram" xmlns:o="urn:schemas-microsoft-com:office:office" xmlns:v="urn:schemas-microsoft-com:vml" xmlns:pvml="urn:schemas-microsoft-com:office:powerpoint" xmlns:com="http://schemas.openxmlformats.org/drawingml/2006/compatibility" xmlns:p14="http://schemas.microsoft.com/office/powerpoint/2010/main" xmlns:p15="http://schemas.microsoft.com/office/powerpoint/2012/main" showMasterPhAnim="0" showMasterSp="0">
   <p:cSld>
     <p:spTree>
       <p:nvGrpSpPr>
-        <p:cNvPr id="136" name="Shape 136"/>
+        <p:cNvPr id="192" name="Shape 192"/>
         <p:cNvGrpSpPr/>
         <p:nvPr/>
       </p:nvGrpSpPr>
@@ -810,7 +812,7 @@
       </p:grpSpPr>
       <p:sp>
         <p:nvSpPr>
-          <p:cNvPr id="137" name="Google Shape;137;g5218d689bc_3_4:notes"/>
+          <p:cNvPr id="193" name="Google Shape;193;g4e9aba5072_0_5:notes"/>
           <p:cNvSpPr/>
           <p:nvPr>
             <p:ph idx="2" type="sldImg"/>
@@ -845,7 +847,7 @@
       </p:sp>
       <p:sp>
         <p:nvSpPr>
-          <p:cNvPr id="138" name="Google Shape;138;g5218d689bc_3_4:notes"/>
+          <p:cNvPr id="194" name="Google Shape;194;g4e9aba5072_0_5:notes"/>
           <p:cNvSpPr txBox="1"/>
           <p:nvPr>
             <p:ph idx="1" type="body"/>
@@ -876,7 +878,8 @@
               <a:buNone/>
             </a:pPr>
             <a:r>
-              <a:t/>
+              <a:rPr lang="en"/>
+              <a:t>Patti</a:t>
             </a:r>
             <a:endParaRPr/>
           </a:p>
@@ -890,12 +893,12 @@
 </p:notes>
 </file>
 
-<file path=ppt/notesSlides/notesSlide3.xml><?xml version="1.0" encoding="utf-8"?>
+<file path=ppt/notesSlides/notesSlide11.xml><?xml version="1.0" encoding="utf-8"?>
 <p:notes xmlns:a="http://schemas.openxmlformats.org/drawingml/2006/main" xmlns:r="http://schemas.openxmlformats.org/officeDocument/2006/relationships" xmlns:mc="http://schemas.openxmlformats.org/markup-compatibility/2006" xmlns:mv="urn:schemas-microsoft-com:mac:vml" xmlns:p="http://schemas.openxmlformats.org/presentationml/2006/main" xmlns:c="http://schemas.openxmlformats.org/drawingml/2006/chart" xmlns:dgm="http://schemas.openxmlformats.org/drawingml/2006/diagram" xmlns:o="urn:schemas-microsoft-com:office:office" xmlns:v="urn:schemas-microsoft-com:vml" xmlns:pvml="urn:schemas-microsoft-com:office:powerpoint" xmlns:com="http://schemas.openxmlformats.org/drawingml/2006/compatibility" xmlns:p14="http://schemas.microsoft.com/office/powerpoint/2010/main" xmlns:p15="http://schemas.microsoft.com/office/powerpoint/2012/main" showMasterPhAnim="0" showMasterSp="0">
   <p:cSld>
     <p:spTree>
       <p:nvGrpSpPr>
-        <p:cNvPr id="143" name="Shape 143"/>
+        <p:cNvPr id="201" name="Shape 201"/>
         <p:cNvGrpSpPr/>
         <p:nvPr/>
       </p:nvGrpSpPr>
@@ -909,7 +912,7 @@
       </p:grpSpPr>
       <p:sp>
         <p:nvSpPr>
-          <p:cNvPr id="144" name="Google Shape;144;g54e54f79d3_3_10:notes"/>
+          <p:cNvPr id="202" name="Google Shape;202;g5218d689bc_3_4:notes"/>
           <p:cNvSpPr/>
           <p:nvPr>
             <p:ph idx="2" type="sldImg"/>
@@ -944,7 +947,205 @@
       </p:sp>
       <p:sp>
         <p:nvSpPr>
-          <p:cNvPr id="145" name="Google Shape;145;g54e54f79d3_3_10:notes"/>
+          <p:cNvPr id="203" name="Google Shape;203;g5218d689bc_3_4:notes"/>
+          <p:cNvSpPr txBox="1"/>
+          <p:nvPr>
+            <p:ph idx="1" type="body"/>
+          </p:nvPr>
+        </p:nvSpPr>
+        <p:spPr>
+          <a:xfrm>
+            <a:off x="685800" y="4343400"/>
+            <a:ext cx="5486400" cy="4114800"/>
+          </a:xfrm>
+          <a:prstGeom prst="rect">
+            <a:avLst/>
+          </a:prstGeom>
+        </p:spPr>
+        <p:txBody>
+          <a:bodyPr anchorCtr="0" anchor="t" bIns="91425" lIns="91425" spcFirstLastPara="1" rIns="91425" wrap="square" tIns="91425">
+            <a:noAutofit/>
+          </a:bodyPr>
+          <a:lstStyle/>
+          <a:p>
+            <a:pPr indent="0" lvl="0" marL="0" rtl="0" algn="l">
+              <a:spcBef>
+                <a:spcPts val="0"/>
+              </a:spcBef>
+              <a:spcAft>
+                <a:spcPts val="0"/>
+              </a:spcAft>
+              <a:buNone/>
+            </a:pPr>
+            <a:r>
+              <a:t/>
+            </a:r>
+            <a:endParaRPr/>
+          </a:p>
+        </p:txBody>
+      </p:sp>
+    </p:spTree>
+  </p:cSld>
+  <p:clrMapOvr>
+    <a:masterClrMapping/>
+  </p:clrMapOvr>
+</p:notes>
+</file>
+
+<file path=ppt/notesSlides/notesSlide2.xml><?xml version="1.0" encoding="utf-8"?>
+<p:notes xmlns:a="http://schemas.openxmlformats.org/drawingml/2006/main" xmlns:r="http://schemas.openxmlformats.org/officeDocument/2006/relationships" xmlns:mc="http://schemas.openxmlformats.org/markup-compatibility/2006" xmlns:mv="urn:schemas-microsoft-com:mac:vml" xmlns:p="http://schemas.openxmlformats.org/presentationml/2006/main" xmlns:c="http://schemas.openxmlformats.org/drawingml/2006/chart" xmlns:dgm="http://schemas.openxmlformats.org/drawingml/2006/diagram" xmlns:o="urn:schemas-microsoft-com:office:office" xmlns:v="urn:schemas-microsoft-com:vml" xmlns:pvml="urn:schemas-microsoft-com:office:powerpoint" xmlns:com="http://schemas.openxmlformats.org/drawingml/2006/compatibility" xmlns:p14="http://schemas.microsoft.com/office/powerpoint/2010/main" xmlns:p15="http://schemas.microsoft.com/office/powerpoint/2012/main" showMasterPhAnim="0" showMasterSp="0">
+  <p:cSld>
+    <p:spTree>
+      <p:nvGrpSpPr>
+        <p:cNvPr id="136" name="Shape 136"/>
+        <p:cNvGrpSpPr/>
+        <p:nvPr/>
+      </p:nvGrpSpPr>
+      <p:grpSpPr>
+        <a:xfrm>
+          <a:off x="0" y="0"/>
+          <a:ext cx="0" cy="0"/>
+          <a:chOff x="0" y="0"/>
+          <a:chExt cx="0" cy="0"/>
+        </a:xfrm>
+      </p:grpSpPr>
+      <p:sp>
+        <p:nvSpPr>
+          <p:cNvPr id="137" name="Google Shape;137;g54e54f79d3_3_10:notes"/>
+          <p:cNvSpPr/>
+          <p:nvPr>
+            <p:ph idx="2" type="sldImg"/>
+          </p:nvPr>
+        </p:nvSpPr>
+        <p:spPr>
+          <a:xfrm>
+            <a:off x="381300" y="685800"/>
+            <a:ext cx="6096000" cy="3429000"/>
+          </a:xfrm>
+          <a:custGeom>
+            <a:rect b="b" l="l" r="r" t="t"/>
+            <a:pathLst>
+              <a:path extrusionOk="0" h="120000" w="120000">
+                <a:moveTo>
+                  <a:pt x="0" y="0"/>
+                </a:moveTo>
+                <a:lnTo>
+                  <a:pt x="120000" y="0"/>
+                </a:lnTo>
+                <a:lnTo>
+                  <a:pt x="120000" y="120000"/>
+                </a:lnTo>
+                <a:lnTo>
+                  <a:pt x="0" y="120000"/>
+                </a:lnTo>
+                <a:close/>
+              </a:path>
+            </a:pathLst>
+          </a:custGeom>
+        </p:spPr>
+      </p:sp>
+      <p:sp>
+        <p:nvSpPr>
+          <p:cNvPr id="138" name="Google Shape;138;g54e54f79d3_3_10:notes"/>
+          <p:cNvSpPr txBox="1"/>
+          <p:nvPr>
+            <p:ph idx="1" type="body"/>
+          </p:nvPr>
+        </p:nvSpPr>
+        <p:spPr>
+          <a:xfrm>
+            <a:off x="685800" y="4343400"/>
+            <a:ext cx="5486400" cy="4114800"/>
+          </a:xfrm>
+          <a:prstGeom prst="rect">
+            <a:avLst/>
+          </a:prstGeom>
+        </p:spPr>
+        <p:txBody>
+          <a:bodyPr anchorCtr="0" anchor="t" bIns="91425" lIns="91425" spcFirstLastPara="1" rIns="91425" wrap="square" tIns="91425">
+            <a:noAutofit/>
+          </a:bodyPr>
+          <a:lstStyle/>
+          <a:p>
+            <a:pPr indent="0" lvl="0" marL="0" rtl="0" algn="l">
+              <a:spcBef>
+                <a:spcPts val="0"/>
+              </a:spcBef>
+              <a:spcAft>
+                <a:spcPts val="0"/>
+              </a:spcAft>
+              <a:buNone/>
+            </a:pPr>
+            <a:r>
+              <a:t/>
+            </a:r>
+            <a:endParaRPr/>
+          </a:p>
+        </p:txBody>
+      </p:sp>
+    </p:spTree>
+  </p:cSld>
+  <p:clrMapOvr>
+    <a:masterClrMapping/>
+  </p:clrMapOvr>
+</p:notes>
+</file>
+
+<file path=ppt/notesSlides/notesSlide3.xml><?xml version="1.0" encoding="utf-8"?>
+<p:notes xmlns:a="http://schemas.openxmlformats.org/drawingml/2006/main" xmlns:r="http://schemas.openxmlformats.org/officeDocument/2006/relationships" xmlns:mc="http://schemas.openxmlformats.org/markup-compatibility/2006" xmlns:mv="urn:schemas-microsoft-com:mac:vml" xmlns:p="http://schemas.openxmlformats.org/presentationml/2006/main" xmlns:c="http://schemas.openxmlformats.org/drawingml/2006/chart" xmlns:dgm="http://schemas.openxmlformats.org/drawingml/2006/diagram" xmlns:o="urn:schemas-microsoft-com:office:office" xmlns:v="urn:schemas-microsoft-com:vml" xmlns:pvml="urn:schemas-microsoft-com:office:powerpoint" xmlns:com="http://schemas.openxmlformats.org/drawingml/2006/compatibility" xmlns:p14="http://schemas.microsoft.com/office/powerpoint/2010/main" xmlns:p15="http://schemas.microsoft.com/office/powerpoint/2012/main" showMasterPhAnim="0" showMasterSp="0">
+  <p:cSld>
+    <p:spTree>
+      <p:nvGrpSpPr>
+        <p:cNvPr id="144" name="Shape 144"/>
+        <p:cNvGrpSpPr/>
+        <p:nvPr/>
+      </p:nvGrpSpPr>
+      <p:grpSpPr>
+        <a:xfrm>
+          <a:off x="0" y="0"/>
+          <a:ext cx="0" cy="0"/>
+          <a:chOff x="0" y="0"/>
+          <a:chExt cx="0" cy="0"/>
+        </a:xfrm>
+      </p:grpSpPr>
+      <p:sp>
+        <p:nvSpPr>
+          <p:cNvPr id="145" name="Google Shape;145;g546129fa56_3_0:notes"/>
+          <p:cNvSpPr/>
+          <p:nvPr>
+            <p:ph idx="2" type="sldImg"/>
+          </p:nvPr>
+        </p:nvSpPr>
+        <p:spPr>
+          <a:xfrm>
+            <a:off x="381300" y="685800"/>
+            <a:ext cx="6096000" cy="3429000"/>
+          </a:xfrm>
+          <a:custGeom>
+            <a:rect b="b" l="l" r="r" t="t"/>
+            <a:pathLst>
+              <a:path extrusionOk="0" h="120000" w="120000">
+                <a:moveTo>
+                  <a:pt x="0" y="0"/>
+                </a:moveTo>
+                <a:lnTo>
+                  <a:pt x="120000" y="0"/>
+                </a:lnTo>
+                <a:lnTo>
+                  <a:pt x="120000" y="120000"/>
+                </a:lnTo>
+                <a:lnTo>
+                  <a:pt x="0" y="120000"/>
+                </a:lnTo>
+                <a:close/>
+              </a:path>
+            </a:pathLst>
+          </a:custGeom>
+        </p:spPr>
+      </p:sp>
+      <p:sp>
+        <p:nvSpPr>
+          <p:cNvPr id="146" name="Google Shape;146;g546129fa56_3_0:notes"/>
           <p:cNvSpPr txBox="1"/>
           <p:nvPr>
             <p:ph idx="1" type="body"/>
@@ -1008,7 +1209,7 @@
       </p:grpSpPr>
       <p:sp>
         <p:nvSpPr>
-          <p:cNvPr id="152" name="Google Shape;152;g546129fa56_3_0:notes"/>
+          <p:cNvPr id="152" name="Google Shape;152;g54e54f79d3_3_3:notes"/>
           <p:cNvSpPr/>
           <p:nvPr>
             <p:ph idx="2" type="sldImg"/>
@@ -1043,7 +1244,7 @@
       </p:sp>
       <p:sp>
         <p:nvSpPr>
-          <p:cNvPr id="153" name="Google Shape;153;g546129fa56_3_0:notes"/>
+          <p:cNvPr id="153" name="Google Shape;153;g54e54f79d3_3_3:notes"/>
           <p:cNvSpPr txBox="1"/>
           <p:nvPr>
             <p:ph idx="1" type="body"/>
@@ -1107,7 +1308,7 @@
       </p:grpSpPr>
       <p:sp>
         <p:nvSpPr>
-          <p:cNvPr id="159" name="Google Shape;159;g54e54f79d3_3_3:notes"/>
+          <p:cNvPr id="159" name="Google Shape;159;g546129fa56_1_0:notes"/>
           <p:cNvSpPr/>
           <p:nvPr>
             <p:ph idx="2" type="sldImg"/>
@@ -1142,7 +1343,7 @@
       </p:sp>
       <p:sp>
         <p:nvSpPr>
-          <p:cNvPr id="160" name="Google Shape;160;g54e54f79d3_3_3:notes"/>
+          <p:cNvPr id="160" name="Google Shape;160;g546129fa56_1_0:notes"/>
           <p:cNvSpPr txBox="1"/>
           <p:nvPr>
             <p:ph idx="1" type="body"/>
@@ -1192,7 +1393,7 @@
   <p:cSld>
     <p:spTree>
       <p:nvGrpSpPr>
-        <p:cNvPr id="165" name="Shape 165"/>
+        <p:cNvPr id="166" name="Shape 166"/>
         <p:cNvGrpSpPr/>
         <p:nvPr/>
       </p:nvGrpSpPr>
@@ -1206,7 +1407,7 @@
       </p:grpSpPr>
       <p:sp>
         <p:nvSpPr>
-          <p:cNvPr id="166" name="Google Shape;166;g546129fa56_1_0:notes"/>
+          <p:cNvPr id="167" name="Google Shape;167;g546129fa56_1_5:notes"/>
           <p:cNvSpPr/>
           <p:nvPr>
             <p:ph idx="2" type="sldImg"/>
@@ -1241,7 +1442,7 @@
       </p:sp>
       <p:sp>
         <p:nvSpPr>
-          <p:cNvPr id="167" name="Google Shape;167;g546129fa56_1_0:notes"/>
+          <p:cNvPr id="168" name="Google Shape;168;g546129fa56_1_5:notes"/>
           <p:cNvSpPr txBox="1"/>
           <p:nvPr>
             <p:ph idx="1" type="body"/>
@@ -1305,7 +1506,7 @@
       </p:grpSpPr>
       <p:sp>
         <p:nvSpPr>
-          <p:cNvPr id="174" name="Google Shape;174;g546129fa56_1_5:notes"/>
+          <p:cNvPr id="174" name="Google Shape;174;g54f80ae624_0_0:notes"/>
           <p:cNvSpPr/>
           <p:nvPr>
             <p:ph idx="2" type="sldImg"/>
@@ -1340,7 +1541,7 @@
       </p:sp>
       <p:sp>
         <p:nvSpPr>
-          <p:cNvPr id="175" name="Google Shape;175;g546129fa56_1_5:notes"/>
+          <p:cNvPr id="175" name="Google Shape;175;g54f80ae624_0_0:notes"/>
           <p:cNvSpPr txBox="1"/>
           <p:nvPr>
             <p:ph idx="1" type="body"/>
@@ -1390,7 +1591,7 @@
   <p:cSld>
     <p:spTree>
       <p:nvGrpSpPr>
-        <p:cNvPr id="180" name="Shape 180"/>
+        <p:cNvPr id="179" name="Shape 179"/>
         <p:cNvGrpSpPr/>
         <p:nvPr/>
       </p:nvGrpSpPr>
@@ -1404,7 +1605,7 @@
       </p:grpSpPr>
       <p:sp>
         <p:nvSpPr>
-          <p:cNvPr id="181" name="Google Shape;181;g546129fa56_1_10:notes"/>
+          <p:cNvPr id="180" name="Google Shape;180;g54f80ae624_0_5:notes"/>
           <p:cNvSpPr/>
           <p:nvPr>
             <p:ph idx="2" type="sldImg"/>
@@ -1439,7 +1640,7 @@
       </p:sp>
       <p:sp>
         <p:nvSpPr>
-          <p:cNvPr id="182" name="Google Shape;182;g546129fa56_1_10:notes"/>
+          <p:cNvPr id="181" name="Google Shape;181;g54f80ae624_0_5:notes"/>
           <p:cNvSpPr txBox="1"/>
           <p:nvPr>
             <p:ph idx="1" type="body"/>
@@ -1489,7 +1690,7 @@
   <p:cSld>
     <p:spTree>
       <p:nvGrpSpPr>
-        <p:cNvPr id="187" name="Shape 187"/>
+        <p:cNvPr id="185" name="Shape 185"/>
         <p:cNvGrpSpPr/>
         <p:nvPr/>
       </p:nvGrpSpPr>
@@ -1503,7 +1704,7 @@
       </p:grpSpPr>
       <p:sp>
         <p:nvSpPr>
-          <p:cNvPr id="188" name="Google Shape;188;g4e9aba5072_0_5:notes"/>
+          <p:cNvPr id="186" name="Google Shape;186;g546129fa56_1_10:notes"/>
           <p:cNvSpPr/>
           <p:nvPr>
             <p:ph idx="2" type="sldImg"/>
@@ -1538,7 +1739,7 @@
       </p:sp>
       <p:sp>
         <p:nvSpPr>
-          <p:cNvPr id="189" name="Google Shape;189;g4e9aba5072_0_5:notes"/>
+          <p:cNvPr id="187" name="Google Shape;187;g546129fa56_1_10:notes"/>
           <p:cNvSpPr txBox="1"/>
           <p:nvPr>
             <p:ph idx="1" type="body"/>
@@ -1569,8 +1770,7 @@
               <a:buNone/>
             </a:pPr>
             <a:r>
-              <a:rPr lang="en"/>
-              <a:t>Patti</a:t>
+              <a:t/>
             </a:r>
             <a:endParaRPr/>
           </a:p>
@@ -9845,12 +10045,12 @@
 </p:sld>
 </file>
 
-<file path=ppt/slides/slide2.xml><?xml version="1.0" encoding="utf-8"?>
+<file path=ppt/slides/slide10.xml><?xml version="1.0" encoding="utf-8"?>
 <p:sld xmlns:a="http://schemas.openxmlformats.org/drawingml/2006/main" xmlns:r="http://schemas.openxmlformats.org/officeDocument/2006/relationships" xmlns:mc="http://schemas.openxmlformats.org/markup-compatibility/2006" xmlns:mv="urn:schemas-microsoft-com:mac:vml" xmlns:p="http://schemas.openxmlformats.org/presentationml/2006/main" xmlns:c="http://schemas.openxmlformats.org/drawingml/2006/chart" xmlns:dgm="http://schemas.openxmlformats.org/drawingml/2006/diagram" xmlns:o="urn:schemas-microsoft-com:office:office" xmlns:v="urn:schemas-microsoft-com:vml" xmlns:pvml="urn:schemas-microsoft-com:office:powerpoint" xmlns:com="http://schemas.openxmlformats.org/drawingml/2006/compatibility" xmlns:p14="http://schemas.microsoft.com/office/powerpoint/2010/main" xmlns:p15="http://schemas.microsoft.com/office/powerpoint/2012/main">
   <p:cSld>
     <p:spTree>
       <p:nvGrpSpPr>
-        <p:cNvPr id="139" name="Shape 139"/>
+        <p:cNvPr id="195" name="Shape 195"/>
         <p:cNvGrpSpPr/>
         <p:nvPr/>
       </p:nvGrpSpPr>
@@ -9864,7 +10064,196 @@
       </p:grpSpPr>
       <p:sp>
         <p:nvSpPr>
-          <p:cNvPr id="140" name="Google Shape;140;p14"/>
+          <p:cNvPr id="196" name="Google Shape;196;p22"/>
+          <p:cNvSpPr txBox="1"/>
+          <p:nvPr>
+            <p:ph type="title"/>
+          </p:nvPr>
+        </p:nvSpPr>
+        <p:spPr>
+          <a:xfrm>
+            <a:off x="889200" y="302300"/>
+            <a:ext cx="7038900" cy="914100"/>
+          </a:xfrm>
+          <a:prstGeom prst="rect">
+            <a:avLst/>
+          </a:prstGeom>
+        </p:spPr>
+        <p:txBody>
+          <a:bodyPr anchorCtr="0" anchor="t" bIns="91425" lIns="91425" spcFirstLastPara="1" rIns="91425" wrap="square" tIns="91425">
+            <a:noAutofit/>
+          </a:bodyPr>
+          <a:lstStyle/>
+          <a:p>
+            <a:pPr indent="0" lvl="0" marL="0" rtl="0" algn="l">
+              <a:spcBef>
+                <a:spcPts val="0"/>
+              </a:spcBef>
+              <a:spcAft>
+                <a:spcPts val="0"/>
+              </a:spcAft>
+              <a:buNone/>
+            </a:pPr>
+            <a:r>
+              <a:rPr lang="en"/>
+              <a:t>Scrum Update: March 19 </a:t>
+            </a:r>
+            <a:endParaRPr/>
+          </a:p>
+        </p:txBody>
+      </p:sp>
+      <p:sp>
+        <p:nvSpPr>
+          <p:cNvPr id="197" name="Google Shape;197;p22"/>
+          <p:cNvSpPr txBox="1"/>
+          <p:nvPr>
+            <p:ph idx="1" type="body"/>
+          </p:nvPr>
+        </p:nvSpPr>
+        <p:spPr>
+          <a:xfrm>
+            <a:off x="1422975" y="903488"/>
+            <a:ext cx="2660700" cy="1144800"/>
+          </a:xfrm>
+          <a:prstGeom prst="rect">
+            <a:avLst/>
+          </a:prstGeom>
+        </p:spPr>
+        <p:txBody>
+          <a:bodyPr anchorCtr="0" anchor="t" bIns="91425" lIns="91425" spcFirstLastPara="1" rIns="91425" wrap="square" tIns="91425">
+            <a:noAutofit/>
+          </a:bodyPr>
+          <a:lstStyle/>
+          <a:p>
+            <a:pPr indent="0" lvl="0" marL="0" rtl="0" algn="l">
+              <a:spcBef>
+                <a:spcPts val="0"/>
+              </a:spcBef>
+              <a:spcAft>
+                <a:spcPts val="1600"/>
+              </a:spcAft>
+              <a:buNone/>
+            </a:pPr>
+            <a:r>
+              <a:rPr lang="en"/>
+              <a:t>Still missing key parts</a:t>
+            </a:r>
+            <a:endParaRPr/>
+          </a:p>
+        </p:txBody>
+      </p:sp>
+      <p:pic>
+        <p:nvPicPr>
+          <p:cNvPr id="198" name="Google Shape;198;p22"/>
+          <p:cNvPicPr preferRelativeResize="0"/>
+          <p:nvPr/>
+        </p:nvPicPr>
+        <p:blipFill>
+          <a:blip r:embed="rId3">
+            <a:alphaModFix/>
+          </a:blip>
+          <a:stretch>
+            <a:fillRect/>
+          </a:stretch>
+        </p:blipFill>
+        <p:spPr>
+          <a:xfrm>
+            <a:off x="574130" y="2660238"/>
+            <a:ext cx="3330328" cy="2123387"/>
+          </a:xfrm>
+          <a:prstGeom prst="rect">
+            <a:avLst/>
+          </a:prstGeom>
+          <a:noFill/>
+          <a:ln>
+            <a:noFill/>
+          </a:ln>
+        </p:spPr>
+      </p:pic>
+      <p:pic>
+        <p:nvPicPr>
+          <p:cNvPr id="199" name="Google Shape;199;p22"/>
+          <p:cNvPicPr preferRelativeResize="0"/>
+          <p:nvPr/>
+        </p:nvPicPr>
+        <p:blipFill>
+          <a:blip r:embed="rId4">
+            <a:alphaModFix/>
+          </a:blip>
+          <a:stretch>
+            <a:fillRect/>
+          </a:stretch>
+        </p:blipFill>
+        <p:spPr>
+          <a:xfrm>
+            <a:off x="4357900" y="793775"/>
+            <a:ext cx="4675276" cy="4124125"/>
+          </a:xfrm>
+          <a:prstGeom prst="rect">
+            <a:avLst/>
+          </a:prstGeom>
+          <a:noFill/>
+          <a:ln>
+            <a:noFill/>
+          </a:ln>
+        </p:spPr>
+      </p:pic>
+      <p:pic>
+        <p:nvPicPr>
+          <p:cNvPr id="200" name="Google Shape;200;p22"/>
+          <p:cNvPicPr preferRelativeResize="0"/>
+          <p:nvPr/>
+        </p:nvPicPr>
+        <p:blipFill>
+          <a:blip r:embed="rId5">
+            <a:alphaModFix/>
+          </a:blip>
+          <a:stretch>
+            <a:fillRect/>
+          </a:stretch>
+        </p:blipFill>
+        <p:spPr>
+          <a:xfrm>
+            <a:off x="319625" y="1451055"/>
+            <a:ext cx="3764051" cy="1032896"/>
+          </a:xfrm>
+          <a:prstGeom prst="rect">
+            <a:avLst/>
+          </a:prstGeom>
+          <a:noFill/>
+          <a:ln>
+            <a:noFill/>
+          </a:ln>
+        </p:spPr>
+      </p:pic>
+    </p:spTree>
+  </p:cSld>
+  <p:clrMapOvr>
+    <a:masterClrMapping/>
+  </p:clrMapOvr>
+</p:sld>
+</file>
+
+<file path=ppt/slides/slide11.xml><?xml version="1.0" encoding="utf-8"?>
+<p:sld xmlns:a="http://schemas.openxmlformats.org/drawingml/2006/main" xmlns:r="http://schemas.openxmlformats.org/officeDocument/2006/relationships" xmlns:mc="http://schemas.openxmlformats.org/markup-compatibility/2006" xmlns:mv="urn:schemas-microsoft-com:mac:vml" xmlns:p="http://schemas.openxmlformats.org/presentationml/2006/main" xmlns:c="http://schemas.openxmlformats.org/drawingml/2006/chart" xmlns:dgm="http://schemas.openxmlformats.org/drawingml/2006/diagram" xmlns:o="urn:schemas-microsoft-com:office:office" xmlns:v="urn:schemas-microsoft-com:vml" xmlns:pvml="urn:schemas-microsoft-com:office:powerpoint" xmlns:com="http://schemas.openxmlformats.org/drawingml/2006/compatibility" xmlns:p14="http://schemas.microsoft.com/office/powerpoint/2010/main" xmlns:p15="http://schemas.microsoft.com/office/powerpoint/2012/main">
+  <p:cSld>
+    <p:spTree>
+      <p:nvGrpSpPr>
+        <p:cNvPr id="204" name="Shape 204"/>
+        <p:cNvGrpSpPr/>
+        <p:nvPr/>
+      </p:nvGrpSpPr>
+      <p:grpSpPr>
+        <a:xfrm>
+          <a:off x="0" y="0"/>
+          <a:ext cx="0" cy="0"/>
+          <a:chOff x="0" y="0"/>
+          <a:chExt cx="0" cy="0"/>
+        </a:xfrm>
+      </p:grpSpPr>
+      <p:sp>
+        <p:nvSpPr>
+          <p:cNvPr id="205" name="Google Shape;205;p23"/>
           <p:cNvSpPr txBox="1"/>
           <p:nvPr>
             <p:ph type="title"/>
@@ -9904,7 +10293,7 @@
       </p:sp>
       <p:sp>
         <p:nvSpPr>
-          <p:cNvPr id="141" name="Google Shape;141;p14"/>
+          <p:cNvPr id="206" name="Google Shape;206;p23"/>
           <p:cNvSpPr txBox="1"/>
           <p:nvPr>
             <p:ph idx="1" type="body"/>
@@ -10056,7 +10445,7 @@
                   <a:srgbClr val="FFFFFF"/>
                 </a:solidFill>
               </a:rPr>
-              <a:t>Parse data - TBD</a:t>
+              <a:t>Parse data - Logan</a:t>
             </a:r>
             <a:endParaRPr>
               <a:solidFill>
@@ -10085,7 +10474,7 @@
                   <a:srgbClr val="FFFFFF"/>
                 </a:solidFill>
               </a:rPr>
-              <a:t>Insert data into database -TBD</a:t>
+              <a:t>Insert data into database -Logan</a:t>
             </a:r>
             <a:endParaRPr>
               <a:solidFill>
@@ -10145,7 +10534,7 @@
       </p:sp>
       <p:sp>
         <p:nvSpPr>
-          <p:cNvPr id="142" name="Google Shape;142;p14"/>
+          <p:cNvPr id="207" name="Google Shape;207;p23"/>
           <p:cNvSpPr txBox="1"/>
           <p:nvPr/>
         </p:nvSpPr>
@@ -10334,6 +10723,43 @@
             </a:endParaRPr>
           </a:p>
           <a:p>
+            <a:pPr indent="-304800" lvl="0" marL="457200" rtl="0" algn="l">
+              <a:spcBef>
+                <a:spcPts val="0"/>
+              </a:spcBef>
+              <a:spcAft>
+                <a:spcPts val="0"/>
+              </a:spcAft>
+              <a:buClr>
+                <a:srgbClr val="FFFFFF"/>
+              </a:buClr>
+              <a:buSzPts val="1200"/>
+              <a:buFont typeface="Lato"/>
+              <a:buAutoNum type="arabicPeriod"/>
+            </a:pPr>
+            <a:r>
+              <a:rPr lang="en" sz="1200">
+                <a:solidFill>
+                  <a:srgbClr val="FFFFFF"/>
+                </a:solidFill>
+                <a:latin typeface="Lato"/>
+                <a:ea typeface="Lato"/>
+                <a:cs typeface="Lato"/>
+                <a:sym typeface="Lato"/>
+              </a:rPr>
+              <a:t>Test Docker image</a:t>
+            </a:r>
+            <a:endParaRPr sz="1200">
+              <a:solidFill>
+                <a:srgbClr val="FFFFFF"/>
+              </a:solidFill>
+              <a:latin typeface="Lato"/>
+              <a:ea typeface="Lato"/>
+              <a:cs typeface="Lato"/>
+              <a:sym typeface="Lato"/>
+            </a:endParaRPr>
+          </a:p>
+          <a:p>
             <a:pPr indent="0" lvl="0" marL="0" rtl="0" algn="l">
               <a:spcBef>
                 <a:spcPts val="0"/>
@@ -10366,12 +10792,12 @@
 </p:sld>
 </file>
 
-<file path=ppt/slides/slide3.xml><?xml version="1.0" encoding="utf-8"?>
+<file path=ppt/slides/slide2.xml><?xml version="1.0" encoding="utf-8"?>
 <p:sld xmlns:a="http://schemas.openxmlformats.org/drawingml/2006/main" xmlns:r="http://schemas.openxmlformats.org/officeDocument/2006/relationships" xmlns:mc="http://schemas.openxmlformats.org/markup-compatibility/2006" xmlns:mv="urn:schemas-microsoft-com:mac:vml" xmlns:p="http://schemas.openxmlformats.org/presentationml/2006/main" xmlns:c="http://schemas.openxmlformats.org/drawingml/2006/chart" xmlns:dgm="http://schemas.openxmlformats.org/drawingml/2006/diagram" xmlns:o="urn:schemas-microsoft-com:office:office" xmlns:v="urn:schemas-microsoft-com:vml" xmlns:pvml="urn:schemas-microsoft-com:office:powerpoint" xmlns:com="http://schemas.openxmlformats.org/drawingml/2006/compatibility" xmlns:p14="http://schemas.microsoft.com/office/powerpoint/2010/main" xmlns:p15="http://schemas.microsoft.com/office/powerpoint/2012/main">
   <p:cSld>
     <p:spTree>
       <p:nvGrpSpPr>
-        <p:cNvPr id="146" name="Shape 146"/>
+        <p:cNvPr id="139" name="Shape 139"/>
         <p:cNvGrpSpPr/>
         <p:nvPr/>
       </p:nvGrpSpPr>
@@ -10385,7 +10811,7 @@
       </p:grpSpPr>
       <p:sp>
         <p:nvSpPr>
-          <p:cNvPr id="147" name="Google Shape;147;p15"/>
+          <p:cNvPr id="140" name="Google Shape;140;p14"/>
           <p:cNvSpPr txBox="1"/>
           <p:nvPr>
             <p:ph type="title"/>
@@ -10425,7 +10851,7 @@
       </p:sp>
       <p:sp>
         <p:nvSpPr>
-          <p:cNvPr id="148" name="Google Shape;148;p15"/>
+          <p:cNvPr id="141" name="Google Shape;141;p14"/>
           <p:cNvSpPr txBox="1"/>
           <p:nvPr>
             <p:ph idx="1" type="body"/>
@@ -10465,7 +10891,7 @@
       </p:sp>
       <p:pic>
         <p:nvPicPr>
-          <p:cNvPr id="149" name="Google Shape;149;p15"/>
+          <p:cNvPr id="142" name="Google Shape;142;p14"/>
           <p:cNvPicPr preferRelativeResize="0"/>
           <p:nvPr/>
         </p:nvPicPr>
@@ -10493,7 +10919,7 @@
       </p:pic>
       <p:pic>
         <p:nvPicPr>
-          <p:cNvPr id="150" name="Google Shape;150;p15"/>
+          <p:cNvPr id="143" name="Google Shape;143;p14"/>
           <p:cNvPicPr preferRelativeResize="0"/>
           <p:nvPr/>
         </p:nvPicPr>
@@ -10509,6 +10935,155 @@
           <a:xfrm>
             <a:off x="5316925" y="844900"/>
             <a:ext cx="3651375" cy="4168026"/>
+          </a:xfrm>
+          <a:prstGeom prst="rect">
+            <a:avLst/>
+          </a:prstGeom>
+          <a:noFill/>
+          <a:ln>
+            <a:noFill/>
+          </a:ln>
+        </p:spPr>
+      </p:pic>
+    </p:spTree>
+  </p:cSld>
+  <p:clrMapOvr>
+    <a:masterClrMapping/>
+  </p:clrMapOvr>
+</p:sld>
+</file>
+
+<file path=ppt/slides/slide3.xml><?xml version="1.0" encoding="utf-8"?>
+<p:sld xmlns:a="http://schemas.openxmlformats.org/drawingml/2006/main" xmlns:r="http://schemas.openxmlformats.org/officeDocument/2006/relationships" xmlns:mc="http://schemas.openxmlformats.org/markup-compatibility/2006" xmlns:mv="urn:schemas-microsoft-com:mac:vml" xmlns:p="http://schemas.openxmlformats.org/presentationml/2006/main" xmlns:c="http://schemas.openxmlformats.org/drawingml/2006/chart" xmlns:dgm="http://schemas.openxmlformats.org/drawingml/2006/diagram" xmlns:o="urn:schemas-microsoft-com:office:office" xmlns:v="urn:schemas-microsoft-com:vml" xmlns:pvml="urn:schemas-microsoft-com:office:powerpoint" xmlns:com="http://schemas.openxmlformats.org/drawingml/2006/compatibility" xmlns:p14="http://schemas.microsoft.com/office/powerpoint/2010/main" xmlns:p15="http://schemas.microsoft.com/office/powerpoint/2012/main">
+  <p:cSld>
+    <p:spTree>
+      <p:nvGrpSpPr>
+        <p:cNvPr id="147" name="Shape 147"/>
+        <p:cNvGrpSpPr/>
+        <p:nvPr/>
+      </p:nvGrpSpPr>
+      <p:grpSpPr>
+        <a:xfrm>
+          <a:off x="0" y="0"/>
+          <a:ext cx="0" cy="0"/>
+          <a:chOff x="0" y="0"/>
+          <a:chExt cx="0" cy="0"/>
+        </a:xfrm>
+      </p:grpSpPr>
+      <p:sp>
+        <p:nvSpPr>
+          <p:cNvPr id="148" name="Google Shape;148;p15"/>
+          <p:cNvSpPr txBox="1"/>
+          <p:nvPr>
+            <p:ph type="title"/>
+          </p:nvPr>
+        </p:nvSpPr>
+        <p:spPr>
+          <a:xfrm>
+            <a:off x="1297500" y="393750"/>
+            <a:ext cx="7038900" cy="914100"/>
+          </a:xfrm>
+          <a:prstGeom prst="rect">
+            <a:avLst/>
+          </a:prstGeom>
+        </p:spPr>
+        <p:txBody>
+          <a:bodyPr anchorCtr="0" anchor="t" bIns="91425" lIns="91425" spcFirstLastPara="1" rIns="91425" wrap="square" tIns="91425">
+            <a:noAutofit/>
+          </a:bodyPr>
+          <a:lstStyle/>
+          <a:p>
+            <a:pPr indent="0" lvl="0" marL="0" rtl="0" algn="l">
+              <a:spcBef>
+                <a:spcPts val="0"/>
+              </a:spcBef>
+              <a:spcAft>
+                <a:spcPts val="0"/>
+              </a:spcAft>
+              <a:buNone/>
+            </a:pPr>
+            <a:r>
+              <a:rPr lang="en"/>
+              <a:t>Encryption...</a:t>
+            </a:r>
+            <a:endParaRPr/>
+          </a:p>
+        </p:txBody>
+      </p:sp>
+      <p:sp>
+        <p:nvSpPr>
+          <p:cNvPr id="149" name="Google Shape;149;p15"/>
+          <p:cNvSpPr txBox="1"/>
+          <p:nvPr>
+            <p:ph idx="1" type="body"/>
+          </p:nvPr>
+        </p:nvSpPr>
+        <p:spPr>
+          <a:xfrm>
+            <a:off x="1297500" y="1567550"/>
+            <a:ext cx="2862900" cy="2911200"/>
+          </a:xfrm>
+          <a:prstGeom prst="rect">
+            <a:avLst/>
+          </a:prstGeom>
+        </p:spPr>
+        <p:txBody>
+          <a:bodyPr anchorCtr="0" anchor="t" bIns="91425" lIns="91425" spcFirstLastPara="1" rIns="91425" wrap="square" tIns="91425">
+            <a:noAutofit/>
+          </a:bodyPr>
+          <a:lstStyle/>
+          <a:p>
+            <a:pPr indent="0" lvl="0" marL="0" rtl="0" algn="l">
+              <a:spcBef>
+                <a:spcPts val="0"/>
+              </a:spcBef>
+              <a:spcAft>
+                <a:spcPts val="0"/>
+              </a:spcAft>
+              <a:buNone/>
+            </a:pPr>
+            <a:r>
+              <a:rPr lang="en"/>
+              <a:t>Trying to avoid having encryption key on github &amp; docker image</a:t>
+            </a:r>
+            <a:endParaRPr/>
+          </a:p>
+          <a:p>
+            <a:pPr indent="0" lvl="0" marL="0" rtl="0" algn="l">
+              <a:spcBef>
+                <a:spcPts val="1600"/>
+              </a:spcBef>
+              <a:spcAft>
+                <a:spcPts val="1600"/>
+              </a:spcAft>
+              <a:buNone/>
+            </a:pPr>
+            <a:r>
+              <a:rPr lang="en"/>
+              <a:t>Workaround may be possible, but key sits right next to database...</a:t>
+            </a:r>
+            <a:endParaRPr/>
+          </a:p>
+        </p:txBody>
+      </p:sp>
+      <p:pic>
+        <p:nvPicPr>
+          <p:cNvPr id="150" name="Google Shape;150;p15"/>
+          <p:cNvPicPr preferRelativeResize="0"/>
+          <p:nvPr/>
+        </p:nvPicPr>
+        <p:blipFill>
+          <a:blip r:embed="rId3">
+            <a:alphaModFix/>
+          </a:blip>
+          <a:stretch>
+            <a:fillRect/>
+          </a:stretch>
+        </p:blipFill>
+        <p:spPr>
+          <a:xfrm>
+            <a:off x="5372650" y="810999"/>
+            <a:ext cx="2963750" cy="3956750"/>
           </a:xfrm>
           <a:prstGeom prst="rect">
             <a:avLst/>
@@ -10578,7 +11153,7 @@
             </a:pPr>
             <a:r>
               <a:rPr lang="en"/>
-              <a:t>Encryption...</a:t>
+              <a:t>Learning to play with plotly</a:t>
             </a:r>
             <a:endParaRPr/>
           </a:p>
@@ -10595,7 +11170,7 @@
         <p:spPr>
           <a:xfrm>
             <a:off x="1297500" y="1567550"/>
-            <a:ext cx="2862900" cy="2911200"/>
+            <a:ext cx="2763900" cy="2911200"/>
           </a:xfrm>
           <a:prstGeom prst="rect">
             <a:avLst/>
@@ -10612,37 +11187,39 @@
                 <a:spcPts val="0"/>
               </a:spcBef>
               <a:spcAft>
-                <a:spcPts val="0"/>
+                <a:spcPts val="1600"/>
               </a:spcAft>
               <a:buNone/>
             </a:pPr>
             <a:r>
               <a:rPr lang="en"/>
-              <a:t>Trying to avoid having encryption key on github &amp; docker image</a:t>
+              <a:t>What is ‘cufflinks’ and why is it necessary?</a:t>
             </a:r>
-            <a:endParaRPr/>
-          </a:p>
-          <a:p>
-            <a:pPr indent="0" lvl="0" marL="0" rtl="0" algn="l">
-              <a:spcBef>
-                <a:spcPts val="1600"/>
-              </a:spcBef>
-              <a:spcAft>
-                <a:spcPts val="1600"/>
-              </a:spcAft>
-              <a:buNone/>
-            </a:pPr>
-            <a:r>
+            <a:br>
               <a:rPr lang="en"/>
-              <a:t>Workaround may be possible, but key sits right next to database...</a:t>
-            </a:r>
+            </a:br>
+            <a:br>
+              <a:rPr lang="en"/>
+            </a:br>
+            <a:br>
+              <a:rPr lang="en"/>
+            </a:br>
+            <a:br>
+              <a:rPr lang="en"/>
+            </a:br>
+            <a:br>
+              <a:rPr lang="en"/>
+            </a:br>
+            <a:br>
+              <a:rPr lang="en"/>
+            </a:br>
             <a:endParaRPr/>
           </a:p>
         </p:txBody>
       </p:sp>
       <p:pic>
         <p:nvPicPr>
-          <p:cNvPr id="157" name="Google Shape;157;p16"/>
+          <p:cNvPr descr="https://cdn.discordapp.com/attachments/428543506429247489/557376104151646209/unknown.png" id="157" name="Google Shape;157;p16"/>
           <p:cNvPicPr preferRelativeResize="0"/>
           <p:nvPr/>
         </p:nvPicPr>
@@ -10656,8 +11233,8 @@
         </p:blipFill>
         <p:spPr>
           <a:xfrm>
-            <a:off x="5372650" y="810999"/>
-            <a:ext cx="2963750" cy="3956750"/>
+            <a:off x="4142950" y="1097925"/>
+            <a:ext cx="4757350" cy="3568000"/>
           </a:xfrm>
           <a:prstGeom prst="rect">
             <a:avLst/>
@@ -10727,157 +11304,6 @@
             </a:pPr>
             <a:r>
               <a:rPr lang="en"/>
-              <a:t>Learning to play with plotly</a:t>
-            </a:r>
-            <a:endParaRPr/>
-          </a:p>
-        </p:txBody>
-      </p:sp>
-      <p:sp>
-        <p:nvSpPr>
-          <p:cNvPr id="163" name="Google Shape;163;p17"/>
-          <p:cNvSpPr txBox="1"/>
-          <p:nvPr>
-            <p:ph idx="1" type="body"/>
-          </p:nvPr>
-        </p:nvSpPr>
-        <p:spPr>
-          <a:xfrm>
-            <a:off x="1297500" y="1567550"/>
-            <a:ext cx="2763900" cy="2911200"/>
-          </a:xfrm>
-          <a:prstGeom prst="rect">
-            <a:avLst/>
-          </a:prstGeom>
-        </p:spPr>
-        <p:txBody>
-          <a:bodyPr anchorCtr="0" anchor="t" bIns="91425" lIns="91425" spcFirstLastPara="1" rIns="91425" wrap="square" tIns="91425">
-            <a:noAutofit/>
-          </a:bodyPr>
-          <a:lstStyle/>
-          <a:p>
-            <a:pPr indent="0" lvl="0" marL="0" rtl="0" algn="l">
-              <a:spcBef>
-                <a:spcPts val="0"/>
-              </a:spcBef>
-              <a:spcAft>
-                <a:spcPts val="1600"/>
-              </a:spcAft>
-              <a:buNone/>
-            </a:pPr>
-            <a:r>
-              <a:rPr lang="en"/>
-              <a:t>What is ‘cufflinks’ and why is it necessary?</a:t>
-            </a:r>
-            <a:br>
-              <a:rPr lang="en"/>
-            </a:br>
-            <a:br>
-              <a:rPr lang="en"/>
-            </a:br>
-            <a:br>
-              <a:rPr lang="en"/>
-            </a:br>
-            <a:br>
-              <a:rPr lang="en"/>
-            </a:br>
-            <a:br>
-              <a:rPr lang="en"/>
-            </a:br>
-            <a:br>
-              <a:rPr lang="en"/>
-            </a:br>
-            <a:endParaRPr/>
-          </a:p>
-        </p:txBody>
-      </p:sp>
-      <p:pic>
-        <p:nvPicPr>
-          <p:cNvPr descr="https://cdn.discordapp.com/attachments/428543506429247489/557376104151646209/unknown.png" id="164" name="Google Shape;164;p17"/>
-          <p:cNvPicPr preferRelativeResize="0"/>
-          <p:nvPr/>
-        </p:nvPicPr>
-        <p:blipFill>
-          <a:blip r:embed="rId3">
-            <a:alphaModFix/>
-          </a:blip>
-          <a:stretch>
-            <a:fillRect/>
-          </a:stretch>
-        </p:blipFill>
-        <p:spPr>
-          <a:xfrm>
-            <a:off x="4142950" y="1097925"/>
-            <a:ext cx="4757350" cy="3568000"/>
-          </a:xfrm>
-          <a:prstGeom prst="rect">
-            <a:avLst/>
-          </a:prstGeom>
-          <a:noFill/>
-          <a:ln>
-            <a:noFill/>
-          </a:ln>
-        </p:spPr>
-      </p:pic>
-    </p:spTree>
-  </p:cSld>
-  <p:clrMapOvr>
-    <a:masterClrMapping/>
-  </p:clrMapOvr>
-</p:sld>
-</file>
-
-<file path=ppt/slides/slide6.xml><?xml version="1.0" encoding="utf-8"?>
-<p:sld xmlns:a="http://schemas.openxmlformats.org/drawingml/2006/main" xmlns:r="http://schemas.openxmlformats.org/officeDocument/2006/relationships" xmlns:mc="http://schemas.openxmlformats.org/markup-compatibility/2006" xmlns:mv="urn:schemas-microsoft-com:mac:vml" xmlns:p="http://schemas.openxmlformats.org/presentationml/2006/main" xmlns:c="http://schemas.openxmlformats.org/drawingml/2006/chart" xmlns:dgm="http://schemas.openxmlformats.org/drawingml/2006/diagram" xmlns:o="urn:schemas-microsoft-com:office:office" xmlns:v="urn:schemas-microsoft-com:vml" xmlns:pvml="urn:schemas-microsoft-com:office:powerpoint" xmlns:com="http://schemas.openxmlformats.org/drawingml/2006/compatibility" xmlns:p14="http://schemas.microsoft.com/office/powerpoint/2010/main" xmlns:p15="http://schemas.microsoft.com/office/powerpoint/2012/main">
-  <p:cSld>
-    <p:spTree>
-      <p:nvGrpSpPr>
-        <p:cNvPr id="168" name="Shape 168"/>
-        <p:cNvGrpSpPr/>
-        <p:nvPr/>
-      </p:nvGrpSpPr>
-      <p:grpSpPr>
-        <a:xfrm>
-          <a:off x="0" y="0"/>
-          <a:ext cx="0" cy="0"/>
-          <a:chOff x="0" y="0"/>
-          <a:chExt cx="0" cy="0"/>
-        </a:xfrm>
-      </p:grpSpPr>
-      <p:sp>
-        <p:nvSpPr>
-          <p:cNvPr id="169" name="Google Shape;169;p18"/>
-          <p:cNvSpPr txBox="1"/>
-          <p:nvPr>
-            <p:ph type="title"/>
-          </p:nvPr>
-        </p:nvSpPr>
-        <p:spPr>
-          <a:xfrm>
-            <a:off x="1297500" y="393750"/>
-            <a:ext cx="7038900" cy="914100"/>
-          </a:xfrm>
-          <a:prstGeom prst="rect">
-            <a:avLst/>
-          </a:prstGeom>
-        </p:spPr>
-        <p:txBody>
-          <a:bodyPr anchorCtr="0" anchor="t" bIns="91425" lIns="91425" spcFirstLastPara="1" rIns="91425" wrap="square" tIns="91425">
-            <a:noAutofit/>
-          </a:bodyPr>
-          <a:lstStyle/>
-          <a:p>
-            <a:pPr indent="0" lvl="0" marL="0" rtl="0" algn="l">
-              <a:spcBef>
-                <a:spcPts val="0"/>
-              </a:spcBef>
-              <a:spcAft>
-                <a:spcPts val="0"/>
-              </a:spcAft>
-              <a:buNone/>
-            </a:pPr>
-            <a:r>
-              <a:rPr lang="en"/>
               <a:t>New Analysis graphs!</a:t>
             </a:r>
             <a:endParaRPr/>
@@ -10886,7 +11312,7 @@
       </p:sp>
       <p:pic>
         <p:nvPicPr>
-          <p:cNvPr id="170" name="Google Shape;170;p18"/>
+          <p:cNvPr id="163" name="Google Shape;163;p17"/>
           <p:cNvPicPr preferRelativeResize="0"/>
           <p:nvPr/>
         </p:nvPicPr>
@@ -10914,7 +11340,7 @@
       </p:pic>
       <p:pic>
         <p:nvPicPr>
-          <p:cNvPr id="171" name="Google Shape;171;p18"/>
+          <p:cNvPr id="164" name="Google Shape;164;p17"/>
           <p:cNvPicPr preferRelativeResize="0"/>
           <p:nvPr/>
         </p:nvPicPr>
@@ -10942,7 +11368,7 @@
       </p:pic>
       <p:pic>
         <p:nvPicPr>
-          <p:cNvPr id="172" name="Google Shape;172;p18"/>
+          <p:cNvPr id="165" name="Google Shape;165;p17"/>
           <p:cNvPicPr preferRelativeResize="0"/>
           <p:nvPr/>
         </p:nvPicPr>
@@ -10956,8 +11382,141 @@
         </p:blipFill>
         <p:spPr>
           <a:xfrm>
-            <a:off x="3751550" y="2123924"/>
+            <a:off x="3751550" y="2084999"/>
             <a:ext cx="3055205" cy="2909626"/>
+          </a:xfrm>
+          <a:prstGeom prst="rect">
+            <a:avLst/>
+          </a:prstGeom>
+          <a:noFill/>
+          <a:ln>
+            <a:noFill/>
+          </a:ln>
+        </p:spPr>
+      </p:pic>
+    </p:spTree>
+  </p:cSld>
+  <p:clrMapOvr>
+    <a:masterClrMapping/>
+  </p:clrMapOvr>
+</p:sld>
+</file>
+
+<file path=ppt/slides/slide6.xml><?xml version="1.0" encoding="utf-8"?>
+<p:sld xmlns:a="http://schemas.openxmlformats.org/drawingml/2006/main" xmlns:r="http://schemas.openxmlformats.org/officeDocument/2006/relationships" xmlns:mc="http://schemas.openxmlformats.org/markup-compatibility/2006" xmlns:mv="urn:schemas-microsoft-com:mac:vml" xmlns:p="http://schemas.openxmlformats.org/presentationml/2006/main" xmlns:c="http://schemas.openxmlformats.org/drawingml/2006/chart" xmlns:dgm="http://schemas.openxmlformats.org/drawingml/2006/diagram" xmlns:o="urn:schemas-microsoft-com:office:office" xmlns:v="urn:schemas-microsoft-com:vml" xmlns:pvml="urn:schemas-microsoft-com:office:powerpoint" xmlns:com="http://schemas.openxmlformats.org/drawingml/2006/compatibility" xmlns:p14="http://schemas.microsoft.com/office/powerpoint/2010/main" xmlns:p15="http://schemas.microsoft.com/office/powerpoint/2012/main">
+  <p:cSld>
+    <p:spTree>
+      <p:nvGrpSpPr>
+        <p:cNvPr id="169" name="Shape 169"/>
+        <p:cNvGrpSpPr/>
+        <p:nvPr/>
+      </p:nvGrpSpPr>
+      <p:grpSpPr>
+        <a:xfrm>
+          <a:off x="0" y="0"/>
+          <a:ext cx="0" cy="0"/>
+          <a:chOff x="0" y="0"/>
+          <a:chExt cx="0" cy="0"/>
+        </a:xfrm>
+      </p:grpSpPr>
+      <p:sp>
+        <p:nvSpPr>
+          <p:cNvPr id="170" name="Google Shape;170;p18"/>
+          <p:cNvSpPr txBox="1"/>
+          <p:nvPr>
+            <p:ph type="title"/>
+          </p:nvPr>
+        </p:nvSpPr>
+        <p:spPr>
+          <a:xfrm>
+            <a:off x="1297500" y="393750"/>
+            <a:ext cx="7038900" cy="914100"/>
+          </a:xfrm>
+          <a:prstGeom prst="rect">
+            <a:avLst/>
+          </a:prstGeom>
+        </p:spPr>
+        <p:txBody>
+          <a:bodyPr anchorCtr="0" anchor="t" bIns="91425" lIns="91425" spcFirstLastPara="1" rIns="91425" wrap="square" tIns="91425">
+            <a:noAutofit/>
+          </a:bodyPr>
+          <a:lstStyle/>
+          <a:p>
+            <a:pPr indent="0" lvl="0" marL="0" rtl="0" algn="l">
+              <a:spcBef>
+                <a:spcPts val="0"/>
+              </a:spcBef>
+              <a:spcAft>
+                <a:spcPts val="0"/>
+              </a:spcAft>
+              <a:buNone/>
+            </a:pPr>
+            <a:r>
+              <a:rPr lang="en"/>
+              <a:t>Query updates</a:t>
+            </a:r>
+            <a:endParaRPr/>
+          </a:p>
+        </p:txBody>
+      </p:sp>
+      <p:sp>
+        <p:nvSpPr>
+          <p:cNvPr id="171" name="Google Shape;171;p18"/>
+          <p:cNvSpPr txBox="1"/>
+          <p:nvPr>
+            <p:ph idx="1" type="body"/>
+          </p:nvPr>
+        </p:nvSpPr>
+        <p:spPr>
+          <a:xfrm>
+            <a:off x="5195375" y="1567550"/>
+            <a:ext cx="3141000" cy="2911200"/>
+          </a:xfrm>
+          <a:prstGeom prst="rect">
+            <a:avLst/>
+          </a:prstGeom>
+        </p:spPr>
+        <p:txBody>
+          <a:bodyPr anchorCtr="0" anchor="t" bIns="91425" lIns="91425" spcFirstLastPara="1" rIns="91425" wrap="square" tIns="91425">
+            <a:noAutofit/>
+          </a:bodyPr>
+          <a:lstStyle/>
+          <a:p>
+            <a:pPr indent="0" lvl="0" marL="0" rtl="0" algn="l">
+              <a:spcBef>
+                <a:spcPts val="0"/>
+              </a:spcBef>
+              <a:spcAft>
+                <a:spcPts val="1600"/>
+              </a:spcAft>
+              <a:buNone/>
+            </a:pPr>
+            <a:r>
+              <a:rPr lang="en"/>
+              <a:t> </a:t>
+            </a:r>
+            <a:endParaRPr/>
+          </a:p>
+        </p:txBody>
+      </p:sp>
+      <p:pic>
+        <p:nvPicPr>
+          <p:cNvPr id="172" name="Google Shape;172;p18"/>
+          <p:cNvPicPr preferRelativeResize="0"/>
+          <p:nvPr/>
+        </p:nvPicPr>
+        <p:blipFill>
+          <a:blip r:embed="rId3">
+            <a:alphaModFix/>
+          </a:blip>
+          <a:stretch>
+            <a:fillRect/>
+          </a:stretch>
+        </p:blipFill>
+        <p:spPr>
+          <a:xfrm>
+            <a:off x="3002127" y="1048100"/>
+            <a:ext cx="3323001" cy="3950076"/>
           </a:xfrm>
           <a:prstGeom prst="rect">
             <a:avLst/>
@@ -11027,47 +11586,7 @@
             </a:pPr>
             <a:r>
               <a:rPr lang="en"/>
-              <a:t>Query updates</a:t>
-            </a:r>
-            <a:endParaRPr/>
-          </a:p>
-        </p:txBody>
-      </p:sp>
-      <p:sp>
-        <p:nvSpPr>
-          <p:cNvPr id="178" name="Google Shape;178;p19"/>
-          <p:cNvSpPr txBox="1"/>
-          <p:nvPr>
-            <p:ph idx="1" type="body"/>
-          </p:nvPr>
-        </p:nvSpPr>
-        <p:spPr>
-          <a:xfrm>
-            <a:off x="5195375" y="1567550"/>
-            <a:ext cx="3141000" cy="2911200"/>
-          </a:xfrm>
-          <a:prstGeom prst="rect">
-            <a:avLst/>
-          </a:prstGeom>
-        </p:spPr>
-        <p:txBody>
-          <a:bodyPr anchorCtr="0" anchor="t" bIns="91425" lIns="91425" spcFirstLastPara="1" rIns="91425" wrap="square" tIns="91425">
-            <a:noAutofit/>
-          </a:bodyPr>
-          <a:lstStyle/>
-          <a:p>
-            <a:pPr indent="0" lvl="0" marL="0" rtl="0" algn="l">
-              <a:spcBef>
-                <a:spcPts val="0"/>
-              </a:spcBef>
-              <a:spcAft>
-                <a:spcPts val="1600"/>
-              </a:spcAft>
-              <a:buNone/>
-            </a:pPr>
-            <a:r>
-              <a:rPr lang="en"/>
-              <a:t> </a:t>
+              <a:t>Using Pandas DataFrame</a:t>
             </a:r>
             <a:endParaRPr/>
           </a:p>
@@ -11075,7 +11594,7 @@
       </p:sp>
       <p:pic>
         <p:nvPicPr>
-          <p:cNvPr id="179" name="Google Shape;179;p19"/>
+          <p:cNvPr id="178" name="Google Shape;178;p19"/>
           <p:cNvPicPr preferRelativeResize="0"/>
           <p:nvPr/>
         </p:nvPicPr>
@@ -11089,8 +11608,8 @@
         </p:blipFill>
         <p:spPr>
           <a:xfrm>
-            <a:off x="3002127" y="1048100"/>
-            <a:ext cx="3323001" cy="3950076"/>
+            <a:off x="1297512" y="963461"/>
+            <a:ext cx="6753423" cy="4051000"/>
           </a:xfrm>
           <a:prstGeom prst="rect">
             <a:avLst/>
@@ -11114,7 +11633,7 @@
   <p:cSld>
     <p:spTree>
       <p:nvGrpSpPr>
-        <p:cNvPr id="183" name="Shape 183"/>
+        <p:cNvPr id="182" name="Shape 182"/>
         <p:cNvGrpSpPr/>
         <p:nvPr/>
       </p:nvGrpSpPr>
@@ -11128,7 +11647,7 @@
       </p:grpSpPr>
       <p:sp>
         <p:nvSpPr>
-          <p:cNvPr id="184" name="Google Shape;184;p20"/>
+          <p:cNvPr id="183" name="Google Shape;183;p20"/>
           <p:cNvSpPr txBox="1"/>
           <p:nvPr>
             <p:ph type="title"/>
@@ -11160,6 +11679,178 @@
             </a:pPr>
             <a:r>
               <a:rPr lang="en"/>
+              <a:t>Query Page Progress Update:</a:t>
+            </a:r>
+            <a:endParaRPr/>
+          </a:p>
+        </p:txBody>
+      </p:sp>
+      <p:sp>
+        <p:nvSpPr>
+          <p:cNvPr id="184" name="Google Shape;184;p20"/>
+          <p:cNvSpPr txBox="1"/>
+          <p:nvPr>
+            <p:ph idx="1" type="body"/>
+          </p:nvPr>
+        </p:nvSpPr>
+        <p:spPr>
+          <a:xfrm>
+            <a:off x="1297500" y="1567550"/>
+            <a:ext cx="7038900" cy="2911200"/>
+          </a:xfrm>
+          <a:prstGeom prst="rect">
+            <a:avLst/>
+          </a:prstGeom>
+        </p:spPr>
+        <p:txBody>
+          <a:bodyPr anchorCtr="0" anchor="t" bIns="91425" lIns="91425" spcFirstLastPara="1" rIns="91425" wrap="square" tIns="91425">
+            <a:noAutofit/>
+          </a:bodyPr>
+          <a:lstStyle/>
+          <a:p>
+            <a:pPr indent="0" lvl="0" marL="457200" rtl="0" algn="l">
+              <a:spcBef>
+                <a:spcPts val="0"/>
+              </a:spcBef>
+              <a:spcAft>
+                <a:spcPts val="0"/>
+              </a:spcAft>
+              <a:buNone/>
+            </a:pPr>
+            <a:r>
+              <a:rPr lang="en"/>
+              <a:t>Working:</a:t>
+            </a:r>
+            <a:endParaRPr/>
+          </a:p>
+          <a:p>
+            <a:pPr indent="-311150" lvl="0" marL="457200" rtl="0" algn="l">
+              <a:spcBef>
+                <a:spcPts val="1600"/>
+              </a:spcBef>
+              <a:spcAft>
+                <a:spcPts val="0"/>
+              </a:spcAft>
+              <a:buSzPts val="1300"/>
+              <a:buChar char="-"/>
+            </a:pPr>
+            <a:r>
+              <a:rPr lang="en"/>
+              <a:t>SQLite DB connected to Query Page</a:t>
+            </a:r>
+            <a:endParaRPr/>
+          </a:p>
+          <a:p>
+            <a:pPr indent="-311150" lvl="0" marL="457200" rtl="0" algn="l">
+              <a:spcBef>
+                <a:spcPts val="0"/>
+              </a:spcBef>
+              <a:spcAft>
+                <a:spcPts val="0"/>
+              </a:spcAft>
+              <a:buSzPts val="1300"/>
+              <a:buChar char="-"/>
+            </a:pPr>
+            <a:r>
+              <a:rPr lang="en"/>
+              <a:t>New Query -&gt; Table Creation</a:t>
+            </a:r>
+            <a:endParaRPr/>
+          </a:p>
+          <a:p>
+            <a:pPr indent="0" lvl="0" marL="457200" rtl="0" algn="l">
+              <a:spcBef>
+                <a:spcPts val="1600"/>
+              </a:spcBef>
+              <a:spcAft>
+                <a:spcPts val="0"/>
+              </a:spcAft>
+              <a:buNone/>
+            </a:pPr>
+            <a:r>
+              <a:rPr lang="en"/>
+              <a:t>Not Working:</a:t>
+            </a:r>
+            <a:endParaRPr/>
+          </a:p>
+          <a:p>
+            <a:pPr indent="-311150" lvl="0" marL="457200" rtl="0" algn="l">
+              <a:spcBef>
+                <a:spcPts val="1600"/>
+              </a:spcBef>
+              <a:spcAft>
+                <a:spcPts val="0"/>
+              </a:spcAft>
+              <a:buSzPts val="1300"/>
+              <a:buChar char="-"/>
+            </a:pPr>
+            <a:r>
+              <a:rPr lang="en"/>
+              <a:t>Difficulties Storing Tweet Data</a:t>
+            </a:r>
+            <a:endParaRPr/>
+          </a:p>
+        </p:txBody>
+      </p:sp>
+    </p:spTree>
+  </p:cSld>
+  <p:clrMapOvr>
+    <a:masterClrMapping/>
+  </p:clrMapOvr>
+</p:sld>
+</file>
+
+<file path=ppt/slides/slide9.xml><?xml version="1.0" encoding="utf-8"?>
+<p:sld xmlns:a="http://schemas.openxmlformats.org/drawingml/2006/main" xmlns:r="http://schemas.openxmlformats.org/officeDocument/2006/relationships" xmlns:mc="http://schemas.openxmlformats.org/markup-compatibility/2006" xmlns:mv="urn:schemas-microsoft-com:mac:vml" xmlns:p="http://schemas.openxmlformats.org/presentationml/2006/main" xmlns:c="http://schemas.openxmlformats.org/drawingml/2006/chart" xmlns:dgm="http://schemas.openxmlformats.org/drawingml/2006/diagram" xmlns:o="urn:schemas-microsoft-com:office:office" xmlns:v="urn:schemas-microsoft-com:vml" xmlns:pvml="urn:schemas-microsoft-com:office:powerpoint" xmlns:com="http://schemas.openxmlformats.org/drawingml/2006/compatibility" xmlns:p14="http://schemas.microsoft.com/office/powerpoint/2010/main" xmlns:p15="http://schemas.microsoft.com/office/powerpoint/2012/main">
+  <p:cSld>
+    <p:spTree>
+      <p:nvGrpSpPr>
+        <p:cNvPr id="188" name="Shape 188"/>
+        <p:cNvGrpSpPr/>
+        <p:nvPr/>
+      </p:nvGrpSpPr>
+      <p:grpSpPr>
+        <a:xfrm>
+          <a:off x="0" y="0"/>
+          <a:ext cx="0" cy="0"/>
+          <a:chOff x="0" y="0"/>
+          <a:chExt cx="0" cy="0"/>
+        </a:xfrm>
+      </p:grpSpPr>
+      <p:sp>
+        <p:nvSpPr>
+          <p:cNvPr id="189" name="Google Shape;189;p21"/>
+          <p:cNvSpPr txBox="1"/>
+          <p:nvPr>
+            <p:ph type="title"/>
+          </p:nvPr>
+        </p:nvSpPr>
+        <p:spPr>
+          <a:xfrm>
+            <a:off x="1297500" y="393750"/>
+            <a:ext cx="7038900" cy="914100"/>
+          </a:xfrm>
+          <a:prstGeom prst="rect">
+            <a:avLst/>
+          </a:prstGeom>
+        </p:spPr>
+        <p:txBody>
+          <a:bodyPr anchorCtr="0" anchor="t" bIns="91425" lIns="91425" spcFirstLastPara="1" rIns="91425" wrap="square" tIns="91425">
+            <a:noAutofit/>
+          </a:bodyPr>
+          <a:lstStyle/>
+          <a:p>
+            <a:pPr indent="0" lvl="0" marL="0" rtl="0" algn="l">
+              <a:spcBef>
+                <a:spcPts val="0"/>
+              </a:spcBef>
+              <a:spcAft>
+                <a:spcPts val="0"/>
+              </a:spcAft>
+              <a:buNone/>
+            </a:pPr>
+            <a:r>
+              <a:rPr lang="en"/>
               <a:t>We’ve gone public!</a:t>
             </a:r>
             <a:endParaRPr/>
@@ -11168,7 +11859,7 @@
       </p:sp>
       <p:sp>
         <p:nvSpPr>
-          <p:cNvPr id="185" name="Google Shape;185;p20"/>
+          <p:cNvPr id="190" name="Google Shape;190;p21"/>
           <p:cNvSpPr txBox="1"/>
           <p:nvPr>
             <p:ph idx="1" type="body"/>
@@ -11270,7 +11961,7 @@
       </p:sp>
       <p:pic>
         <p:nvPicPr>
-          <p:cNvPr id="186" name="Google Shape;186;p20"/>
+          <p:cNvPr id="191" name="Google Shape;191;p21"/>
           <p:cNvPicPr preferRelativeResize="0"/>
           <p:nvPr/>
         </p:nvPicPr>
@@ -11284,197 +11975,8 @@
         </p:blipFill>
         <p:spPr>
           <a:xfrm>
-            <a:off x="4288590" y="808738"/>
+            <a:off x="4296015" y="934738"/>
             <a:ext cx="4701360" cy="3526025"/>
-          </a:xfrm>
-          <a:prstGeom prst="rect">
-            <a:avLst/>
-          </a:prstGeom>
-          <a:noFill/>
-          <a:ln>
-            <a:noFill/>
-          </a:ln>
-        </p:spPr>
-      </p:pic>
-    </p:spTree>
-  </p:cSld>
-  <p:clrMapOvr>
-    <a:masterClrMapping/>
-  </p:clrMapOvr>
-</p:sld>
-</file>
-
-<file path=ppt/slides/slide9.xml><?xml version="1.0" encoding="utf-8"?>
-<p:sld xmlns:a="http://schemas.openxmlformats.org/drawingml/2006/main" xmlns:r="http://schemas.openxmlformats.org/officeDocument/2006/relationships" xmlns:mc="http://schemas.openxmlformats.org/markup-compatibility/2006" xmlns:mv="urn:schemas-microsoft-com:mac:vml" xmlns:p="http://schemas.openxmlformats.org/presentationml/2006/main" xmlns:c="http://schemas.openxmlformats.org/drawingml/2006/chart" xmlns:dgm="http://schemas.openxmlformats.org/drawingml/2006/diagram" xmlns:o="urn:schemas-microsoft-com:office:office" xmlns:v="urn:schemas-microsoft-com:vml" xmlns:pvml="urn:schemas-microsoft-com:office:powerpoint" xmlns:com="http://schemas.openxmlformats.org/drawingml/2006/compatibility" xmlns:p14="http://schemas.microsoft.com/office/powerpoint/2010/main" xmlns:p15="http://schemas.microsoft.com/office/powerpoint/2012/main">
-  <p:cSld>
-    <p:spTree>
-      <p:nvGrpSpPr>
-        <p:cNvPr id="190" name="Shape 190"/>
-        <p:cNvGrpSpPr/>
-        <p:nvPr/>
-      </p:nvGrpSpPr>
-      <p:grpSpPr>
-        <a:xfrm>
-          <a:off x="0" y="0"/>
-          <a:ext cx="0" cy="0"/>
-          <a:chOff x="0" y="0"/>
-          <a:chExt cx="0" cy="0"/>
-        </a:xfrm>
-      </p:grpSpPr>
-      <p:sp>
-        <p:nvSpPr>
-          <p:cNvPr id="191" name="Google Shape;191;p21"/>
-          <p:cNvSpPr txBox="1"/>
-          <p:nvPr>
-            <p:ph type="title"/>
-          </p:nvPr>
-        </p:nvSpPr>
-        <p:spPr>
-          <a:xfrm>
-            <a:off x="889200" y="302300"/>
-            <a:ext cx="7038900" cy="914100"/>
-          </a:xfrm>
-          <a:prstGeom prst="rect">
-            <a:avLst/>
-          </a:prstGeom>
-        </p:spPr>
-        <p:txBody>
-          <a:bodyPr anchorCtr="0" anchor="t" bIns="91425" lIns="91425" spcFirstLastPara="1" rIns="91425" wrap="square" tIns="91425">
-            <a:noAutofit/>
-          </a:bodyPr>
-          <a:lstStyle/>
-          <a:p>
-            <a:pPr indent="0" lvl="0" marL="0" rtl="0" algn="l">
-              <a:spcBef>
-                <a:spcPts val="0"/>
-              </a:spcBef>
-              <a:spcAft>
-                <a:spcPts val="0"/>
-              </a:spcAft>
-              <a:buNone/>
-            </a:pPr>
-            <a:r>
-              <a:rPr lang="en"/>
-              <a:t>Scrum Update: March 19 </a:t>
-            </a:r>
-            <a:endParaRPr/>
-          </a:p>
-        </p:txBody>
-      </p:sp>
-      <p:sp>
-        <p:nvSpPr>
-          <p:cNvPr id="192" name="Google Shape;192;p21"/>
-          <p:cNvSpPr txBox="1"/>
-          <p:nvPr>
-            <p:ph idx="1" type="body"/>
-          </p:nvPr>
-        </p:nvSpPr>
-        <p:spPr>
-          <a:xfrm>
-            <a:off x="1422975" y="903488"/>
-            <a:ext cx="2660700" cy="1144800"/>
-          </a:xfrm>
-          <a:prstGeom prst="rect">
-            <a:avLst/>
-          </a:prstGeom>
-        </p:spPr>
-        <p:txBody>
-          <a:bodyPr anchorCtr="0" anchor="t" bIns="91425" lIns="91425" spcFirstLastPara="1" rIns="91425" wrap="square" tIns="91425">
-            <a:noAutofit/>
-          </a:bodyPr>
-          <a:lstStyle/>
-          <a:p>
-            <a:pPr indent="0" lvl="0" marL="0" rtl="0" algn="l">
-              <a:spcBef>
-                <a:spcPts val="0"/>
-              </a:spcBef>
-              <a:spcAft>
-                <a:spcPts val="1600"/>
-              </a:spcAft>
-              <a:buNone/>
-            </a:pPr>
-            <a:r>
-              <a:rPr lang="en"/>
-              <a:t>Still missing key parts</a:t>
-            </a:r>
-            <a:endParaRPr/>
-          </a:p>
-        </p:txBody>
-      </p:sp>
-      <p:pic>
-        <p:nvPicPr>
-          <p:cNvPr id="193" name="Google Shape;193;p21"/>
-          <p:cNvPicPr preferRelativeResize="0"/>
-          <p:nvPr/>
-        </p:nvPicPr>
-        <p:blipFill>
-          <a:blip r:embed="rId3">
-            <a:alphaModFix/>
-          </a:blip>
-          <a:stretch>
-            <a:fillRect/>
-          </a:stretch>
-        </p:blipFill>
-        <p:spPr>
-          <a:xfrm>
-            <a:off x="574130" y="2660238"/>
-            <a:ext cx="3330328" cy="2123387"/>
-          </a:xfrm>
-          <a:prstGeom prst="rect">
-            <a:avLst/>
-          </a:prstGeom>
-          <a:noFill/>
-          <a:ln>
-            <a:noFill/>
-          </a:ln>
-        </p:spPr>
-      </p:pic>
-      <p:pic>
-        <p:nvPicPr>
-          <p:cNvPr id="194" name="Google Shape;194;p21"/>
-          <p:cNvPicPr preferRelativeResize="0"/>
-          <p:nvPr/>
-        </p:nvPicPr>
-        <p:blipFill>
-          <a:blip r:embed="rId4">
-            <a:alphaModFix/>
-          </a:blip>
-          <a:stretch>
-            <a:fillRect/>
-          </a:stretch>
-        </p:blipFill>
-        <p:spPr>
-          <a:xfrm>
-            <a:off x="4357900" y="793775"/>
-            <a:ext cx="4675276" cy="4124125"/>
-          </a:xfrm>
-          <a:prstGeom prst="rect">
-            <a:avLst/>
-          </a:prstGeom>
-          <a:noFill/>
-          <a:ln>
-            <a:noFill/>
-          </a:ln>
-        </p:spPr>
-      </p:pic>
-      <p:pic>
-        <p:nvPicPr>
-          <p:cNvPr id="195" name="Google Shape;195;p21"/>
-          <p:cNvPicPr preferRelativeResize="0"/>
-          <p:nvPr/>
-        </p:nvPicPr>
-        <p:blipFill>
-          <a:blip r:embed="rId5">
-            <a:alphaModFix/>
-          </a:blip>
-          <a:stretch>
-            <a:fillRect/>
-          </a:stretch>
-        </p:blipFill>
-        <p:spPr>
-          <a:xfrm>
-            <a:off x="319625" y="1451055"/>
-            <a:ext cx="3764051" cy="1032896"/>
           </a:xfrm>
           <a:prstGeom prst="rect">
             <a:avLst/>

</xml_diff>